<commit_message>
End of campaign 1
Push of FOCAL code at the completion of Campaign 1
</commit_message>
<xml_diff>
--- a/motorConfig/Rotor Drive Tuning.pptx
+++ b/motorConfig/Rotor Drive Tuning.pptx
@@ -13,6 +13,8 @@
     <p:sldId id="261" r:id="rId7"/>
     <p:sldId id="262" r:id="rId8"/>
     <p:sldId id="263" r:id="rId9"/>
+    <p:sldId id="264" r:id="rId10"/>
+    <p:sldId id="265" r:id="rId11"/>
   </p:sldIdLst>
   <p:sldSz cx="12192000" cy="6858000"/>
   <p:notesSz cx="6858000" cy="9144000"/>
@@ -161,10 +163,9 @@
           </a:lstStyle>
           <a:p>
             <a:r>
-              <a:rPr lang="en-US" smtClean="0"/>
+              <a:rPr lang="en-US"/>
               <a:t>Click to edit Master title style</a:t>
             </a:r>
-            <a:endParaRPr lang="en-US"/>
           </a:p>
         </p:txBody>
       </p:sp>
@@ -226,10 +227,9 @@
           </a:lstStyle>
           <a:p>
             <a:r>
-              <a:rPr lang="en-US" smtClean="0"/>
+              <a:rPr lang="en-US"/>
               <a:t>Click to edit Master subtitle style</a:t>
             </a:r>
-            <a:endParaRPr lang="en-US"/>
           </a:p>
         </p:txBody>
       </p:sp>
@@ -250,7 +250,7 @@
           <a:p>
             <a:fld id="{596A6706-5E2E-48A0-97BD-ACBF2C72B120}" type="datetimeFigureOut">
               <a:rPr lang="en-US" smtClean="0"/>
-              <a:t>6/24/2021</a:t>
+              <a:t>9/20/2021</a:t>
             </a:fld>
             <a:endParaRPr lang="en-US"/>
           </a:p>
@@ -344,10 +344,9 @@
           <a:lstStyle/>
           <a:p>
             <a:r>
-              <a:rPr lang="en-US" smtClean="0"/>
+              <a:rPr lang="en-US"/>
               <a:t>Click to edit Master title style</a:t>
             </a:r>
-            <a:endParaRPr lang="en-US"/>
           </a:p>
         </p:txBody>
       </p:sp>
@@ -368,38 +367,37 @@
           <a:p>
             <a:pPr lvl="0"/>
             <a:r>
-              <a:rPr lang="en-US" smtClean="0"/>
+              <a:rPr lang="en-US"/>
               <a:t>Edit Master text styles</a:t>
             </a:r>
           </a:p>
           <a:p>
             <a:pPr lvl="1"/>
             <a:r>
-              <a:rPr lang="en-US" smtClean="0"/>
+              <a:rPr lang="en-US"/>
               <a:t>Second level</a:t>
             </a:r>
           </a:p>
           <a:p>
             <a:pPr lvl="2"/>
             <a:r>
-              <a:rPr lang="en-US" smtClean="0"/>
+              <a:rPr lang="en-US"/>
               <a:t>Third level</a:t>
             </a:r>
           </a:p>
           <a:p>
             <a:pPr lvl="3"/>
             <a:r>
-              <a:rPr lang="en-US" smtClean="0"/>
+              <a:rPr lang="en-US"/>
               <a:t>Fourth level</a:t>
             </a:r>
           </a:p>
           <a:p>
             <a:pPr lvl="4"/>
             <a:r>
-              <a:rPr lang="en-US" smtClean="0"/>
+              <a:rPr lang="en-US"/>
               <a:t>Fifth level</a:t>
             </a:r>
-            <a:endParaRPr lang="en-US"/>
           </a:p>
         </p:txBody>
       </p:sp>
@@ -420,7 +418,7 @@
           <a:p>
             <a:fld id="{596A6706-5E2E-48A0-97BD-ACBF2C72B120}" type="datetimeFigureOut">
               <a:rPr lang="en-US" smtClean="0"/>
-              <a:t>6/24/2021</a:t>
+              <a:t>9/20/2021</a:t>
             </a:fld>
             <a:endParaRPr lang="en-US"/>
           </a:p>
@@ -519,10 +517,9 @@
           <a:lstStyle/>
           <a:p>
             <a:r>
-              <a:rPr lang="en-US" smtClean="0"/>
+              <a:rPr lang="en-US"/>
               <a:t>Click to edit Master title style</a:t>
             </a:r>
-            <a:endParaRPr lang="en-US"/>
           </a:p>
         </p:txBody>
       </p:sp>
@@ -548,38 +545,37 @@
           <a:p>
             <a:pPr lvl="0"/>
             <a:r>
-              <a:rPr lang="en-US" smtClean="0"/>
+              <a:rPr lang="en-US"/>
               <a:t>Edit Master text styles</a:t>
             </a:r>
           </a:p>
           <a:p>
             <a:pPr lvl="1"/>
             <a:r>
-              <a:rPr lang="en-US" smtClean="0"/>
+              <a:rPr lang="en-US"/>
               <a:t>Second level</a:t>
             </a:r>
           </a:p>
           <a:p>
             <a:pPr lvl="2"/>
             <a:r>
-              <a:rPr lang="en-US" smtClean="0"/>
+              <a:rPr lang="en-US"/>
               <a:t>Third level</a:t>
             </a:r>
           </a:p>
           <a:p>
             <a:pPr lvl="3"/>
             <a:r>
-              <a:rPr lang="en-US" smtClean="0"/>
+              <a:rPr lang="en-US"/>
               <a:t>Fourth level</a:t>
             </a:r>
           </a:p>
           <a:p>
             <a:pPr lvl="4"/>
             <a:r>
-              <a:rPr lang="en-US" smtClean="0"/>
+              <a:rPr lang="en-US"/>
               <a:t>Fifth level</a:t>
             </a:r>
-            <a:endParaRPr lang="en-US"/>
           </a:p>
         </p:txBody>
       </p:sp>
@@ -600,7 +596,7 @@
           <a:p>
             <a:fld id="{596A6706-5E2E-48A0-97BD-ACBF2C72B120}" type="datetimeFigureOut">
               <a:rPr lang="en-US" smtClean="0"/>
-              <a:t>6/24/2021</a:t>
+              <a:t>9/20/2021</a:t>
             </a:fld>
             <a:endParaRPr lang="en-US"/>
           </a:p>
@@ -694,10 +690,9 @@
           <a:lstStyle/>
           <a:p>
             <a:r>
-              <a:rPr lang="en-US" smtClean="0"/>
+              <a:rPr lang="en-US"/>
               <a:t>Click to edit Master title style</a:t>
             </a:r>
-            <a:endParaRPr lang="en-US"/>
           </a:p>
         </p:txBody>
       </p:sp>
@@ -718,38 +713,37 @@
           <a:p>
             <a:pPr lvl="0"/>
             <a:r>
-              <a:rPr lang="en-US" smtClean="0"/>
+              <a:rPr lang="en-US"/>
               <a:t>Edit Master text styles</a:t>
             </a:r>
           </a:p>
           <a:p>
             <a:pPr lvl="1"/>
             <a:r>
-              <a:rPr lang="en-US" smtClean="0"/>
+              <a:rPr lang="en-US"/>
               <a:t>Second level</a:t>
             </a:r>
           </a:p>
           <a:p>
             <a:pPr lvl="2"/>
             <a:r>
-              <a:rPr lang="en-US" smtClean="0"/>
+              <a:rPr lang="en-US"/>
               <a:t>Third level</a:t>
             </a:r>
           </a:p>
           <a:p>
             <a:pPr lvl="3"/>
             <a:r>
-              <a:rPr lang="en-US" smtClean="0"/>
+              <a:rPr lang="en-US"/>
               <a:t>Fourth level</a:t>
             </a:r>
           </a:p>
           <a:p>
             <a:pPr lvl="4"/>
             <a:r>
-              <a:rPr lang="en-US" smtClean="0"/>
+              <a:rPr lang="en-US"/>
               <a:t>Fifth level</a:t>
             </a:r>
-            <a:endParaRPr lang="en-US"/>
           </a:p>
         </p:txBody>
       </p:sp>
@@ -770,7 +764,7 @@
           <a:p>
             <a:fld id="{596A6706-5E2E-48A0-97BD-ACBF2C72B120}" type="datetimeFigureOut">
               <a:rPr lang="en-US" smtClean="0"/>
-              <a:t>6/24/2021</a:t>
+              <a:t>9/20/2021</a:t>
             </a:fld>
             <a:endParaRPr lang="en-US"/>
           </a:p>
@@ -873,10 +867,9 @@
           </a:lstStyle>
           <a:p>
             <a:r>
-              <a:rPr lang="en-US" smtClean="0"/>
+              <a:rPr lang="en-US"/>
               <a:t>Click to edit Master title style</a:t>
             </a:r>
-            <a:endParaRPr lang="en-US"/>
           </a:p>
         </p:txBody>
       </p:sp>
@@ -993,7 +986,7 @@
           <a:p>
             <a:pPr lvl="0"/>
             <a:r>
-              <a:rPr lang="en-US" smtClean="0"/>
+              <a:rPr lang="en-US"/>
               <a:t>Edit Master text styles</a:t>
             </a:r>
           </a:p>
@@ -1016,7 +1009,7 @@
           <a:p>
             <a:fld id="{596A6706-5E2E-48A0-97BD-ACBF2C72B120}" type="datetimeFigureOut">
               <a:rPr lang="en-US" smtClean="0"/>
-              <a:t>6/24/2021</a:t>
+              <a:t>9/20/2021</a:t>
             </a:fld>
             <a:endParaRPr lang="en-US"/>
           </a:p>
@@ -1110,10 +1103,9 @@
           <a:lstStyle/>
           <a:p>
             <a:r>
-              <a:rPr lang="en-US" smtClean="0"/>
+              <a:rPr lang="en-US"/>
               <a:t>Click to edit Master title style</a:t>
             </a:r>
-            <a:endParaRPr lang="en-US"/>
           </a:p>
         </p:txBody>
       </p:sp>
@@ -1139,38 +1131,37 @@
           <a:p>
             <a:pPr lvl="0"/>
             <a:r>
-              <a:rPr lang="en-US" smtClean="0"/>
+              <a:rPr lang="en-US"/>
               <a:t>Edit Master text styles</a:t>
             </a:r>
           </a:p>
           <a:p>
             <a:pPr lvl="1"/>
             <a:r>
-              <a:rPr lang="en-US" smtClean="0"/>
+              <a:rPr lang="en-US"/>
               <a:t>Second level</a:t>
             </a:r>
           </a:p>
           <a:p>
             <a:pPr lvl="2"/>
             <a:r>
-              <a:rPr lang="en-US" smtClean="0"/>
+              <a:rPr lang="en-US"/>
               <a:t>Third level</a:t>
             </a:r>
           </a:p>
           <a:p>
             <a:pPr lvl="3"/>
             <a:r>
-              <a:rPr lang="en-US" smtClean="0"/>
+              <a:rPr lang="en-US"/>
               <a:t>Fourth level</a:t>
             </a:r>
           </a:p>
           <a:p>
             <a:pPr lvl="4"/>
             <a:r>
-              <a:rPr lang="en-US" smtClean="0"/>
+              <a:rPr lang="en-US"/>
               <a:t>Fifth level</a:t>
             </a:r>
-            <a:endParaRPr lang="en-US"/>
           </a:p>
         </p:txBody>
       </p:sp>
@@ -1196,38 +1187,37 @@
           <a:p>
             <a:pPr lvl="0"/>
             <a:r>
-              <a:rPr lang="en-US" smtClean="0"/>
+              <a:rPr lang="en-US"/>
               <a:t>Edit Master text styles</a:t>
             </a:r>
           </a:p>
           <a:p>
             <a:pPr lvl="1"/>
             <a:r>
-              <a:rPr lang="en-US" smtClean="0"/>
+              <a:rPr lang="en-US"/>
               <a:t>Second level</a:t>
             </a:r>
           </a:p>
           <a:p>
             <a:pPr lvl="2"/>
             <a:r>
-              <a:rPr lang="en-US" smtClean="0"/>
+              <a:rPr lang="en-US"/>
               <a:t>Third level</a:t>
             </a:r>
           </a:p>
           <a:p>
             <a:pPr lvl="3"/>
             <a:r>
-              <a:rPr lang="en-US" smtClean="0"/>
+              <a:rPr lang="en-US"/>
               <a:t>Fourth level</a:t>
             </a:r>
           </a:p>
           <a:p>
             <a:pPr lvl="4"/>
             <a:r>
-              <a:rPr lang="en-US" smtClean="0"/>
+              <a:rPr lang="en-US"/>
               <a:t>Fifth level</a:t>
             </a:r>
-            <a:endParaRPr lang="en-US"/>
           </a:p>
         </p:txBody>
       </p:sp>
@@ -1248,7 +1238,7 @@
           <a:p>
             <a:fld id="{596A6706-5E2E-48A0-97BD-ACBF2C72B120}" type="datetimeFigureOut">
               <a:rPr lang="en-US" smtClean="0"/>
-              <a:t>6/24/2021</a:t>
+              <a:t>9/20/2021</a:t>
             </a:fld>
             <a:endParaRPr lang="en-US"/>
           </a:p>
@@ -1347,10 +1337,9 @@
           <a:lstStyle/>
           <a:p>
             <a:r>
-              <a:rPr lang="en-US" smtClean="0"/>
+              <a:rPr lang="en-US"/>
               <a:t>Click to edit Master title style</a:t>
             </a:r>
-            <a:endParaRPr lang="en-US"/>
           </a:p>
         </p:txBody>
       </p:sp>
@@ -1413,7 +1402,7 @@
           <a:p>
             <a:pPr lvl="0"/>
             <a:r>
-              <a:rPr lang="en-US" smtClean="0"/>
+              <a:rPr lang="en-US"/>
               <a:t>Edit Master text styles</a:t>
             </a:r>
           </a:p>
@@ -1441,38 +1430,37 @@
           <a:p>
             <a:pPr lvl="0"/>
             <a:r>
-              <a:rPr lang="en-US" smtClean="0"/>
+              <a:rPr lang="en-US"/>
               <a:t>Edit Master text styles</a:t>
             </a:r>
           </a:p>
           <a:p>
             <a:pPr lvl="1"/>
             <a:r>
-              <a:rPr lang="en-US" smtClean="0"/>
+              <a:rPr lang="en-US"/>
               <a:t>Second level</a:t>
             </a:r>
           </a:p>
           <a:p>
             <a:pPr lvl="2"/>
             <a:r>
-              <a:rPr lang="en-US" smtClean="0"/>
+              <a:rPr lang="en-US"/>
               <a:t>Third level</a:t>
             </a:r>
           </a:p>
           <a:p>
             <a:pPr lvl="3"/>
             <a:r>
-              <a:rPr lang="en-US" smtClean="0"/>
+              <a:rPr lang="en-US"/>
               <a:t>Fourth level</a:t>
             </a:r>
           </a:p>
           <a:p>
             <a:pPr lvl="4"/>
             <a:r>
-              <a:rPr lang="en-US" smtClean="0"/>
+              <a:rPr lang="en-US"/>
               <a:t>Fifth level</a:t>
             </a:r>
-            <a:endParaRPr lang="en-US"/>
           </a:p>
         </p:txBody>
       </p:sp>
@@ -1535,7 +1523,7 @@
           <a:p>
             <a:pPr lvl="0"/>
             <a:r>
-              <a:rPr lang="en-US" smtClean="0"/>
+              <a:rPr lang="en-US"/>
               <a:t>Edit Master text styles</a:t>
             </a:r>
           </a:p>
@@ -1563,38 +1551,37 @@
           <a:p>
             <a:pPr lvl="0"/>
             <a:r>
-              <a:rPr lang="en-US" smtClean="0"/>
+              <a:rPr lang="en-US"/>
               <a:t>Edit Master text styles</a:t>
             </a:r>
           </a:p>
           <a:p>
             <a:pPr lvl="1"/>
             <a:r>
-              <a:rPr lang="en-US" smtClean="0"/>
+              <a:rPr lang="en-US"/>
               <a:t>Second level</a:t>
             </a:r>
           </a:p>
           <a:p>
             <a:pPr lvl="2"/>
             <a:r>
-              <a:rPr lang="en-US" smtClean="0"/>
+              <a:rPr lang="en-US"/>
               <a:t>Third level</a:t>
             </a:r>
           </a:p>
           <a:p>
             <a:pPr lvl="3"/>
             <a:r>
-              <a:rPr lang="en-US" smtClean="0"/>
+              <a:rPr lang="en-US"/>
               <a:t>Fourth level</a:t>
             </a:r>
           </a:p>
           <a:p>
             <a:pPr lvl="4"/>
             <a:r>
-              <a:rPr lang="en-US" smtClean="0"/>
+              <a:rPr lang="en-US"/>
               <a:t>Fifth level</a:t>
             </a:r>
-            <a:endParaRPr lang="en-US"/>
           </a:p>
         </p:txBody>
       </p:sp>
@@ -1615,7 +1602,7 @@
           <a:p>
             <a:fld id="{596A6706-5E2E-48A0-97BD-ACBF2C72B120}" type="datetimeFigureOut">
               <a:rPr lang="en-US" smtClean="0"/>
-              <a:t>6/24/2021</a:t>
+              <a:t>9/20/2021</a:t>
             </a:fld>
             <a:endParaRPr lang="en-US"/>
           </a:p>
@@ -1709,10 +1696,9 @@
           <a:lstStyle/>
           <a:p>
             <a:r>
-              <a:rPr lang="en-US" smtClean="0"/>
+              <a:rPr lang="en-US"/>
               <a:t>Click to edit Master title style</a:t>
             </a:r>
-            <a:endParaRPr lang="en-US"/>
           </a:p>
         </p:txBody>
       </p:sp>
@@ -1733,7 +1719,7 @@
           <a:p>
             <a:fld id="{596A6706-5E2E-48A0-97BD-ACBF2C72B120}" type="datetimeFigureOut">
               <a:rPr lang="en-US" smtClean="0"/>
-              <a:t>6/24/2021</a:t>
+              <a:t>9/20/2021</a:t>
             </a:fld>
             <a:endParaRPr lang="en-US"/>
           </a:p>
@@ -1828,7 +1814,7 @@
           <a:p>
             <a:fld id="{596A6706-5E2E-48A0-97BD-ACBF2C72B120}" type="datetimeFigureOut">
               <a:rPr lang="en-US" smtClean="0"/>
-              <a:t>6/24/2021</a:t>
+              <a:t>9/20/2021</a:t>
             </a:fld>
             <a:endParaRPr lang="en-US"/>
           </a:p>
@@ -1931,10 +1917,9 @@
           </a:lstStyle>
           <a:p>
             <a:r>
-              <a:rPr lang="en-US" smtClean="0"/>
+              <a:rPr lang="en-US"/>
               <a:t>Click to edit Master title style</a:t>
             </a:r>
-            <a:endParaRPr lang="en-US"/>
           </a:p>
         </p:txBody>
       </p:sp>
@@ -1988,38 +1973,37 @@
           <a:p>
             <a:pPr lvl="0"/>
             <a:r>
-              <a:rPr lang="en-US" smtClean="0"/>
+              <a:rPr lang="en-US"/>
               <a:t>Edit Master text styles</a:t>
             </a:r>
           </a:p>
           <a:p>
             <a:pPr lvl="1"/>
             <a:r>
-              <a:rPr lang="en-US" smtClean="0"/>
+              <a:rPr lang="en-US"/>
               <a:t>Second level</a:t>
             </a:r>
           </a:p>
           <a:p>
             <a:pPr lvl="2"/>
             <a:r>
-              <a:rPr lang="en-US" smtClean="0"/>
+              <a:rPr lang="en-US"/>
               <a:t>Third level</a:t>
             </a:r>
           </a:p>
           <a:p>
             <a:pPr lvl="3"/>
             <a:r>
-              <a:rPr lang="en-US" smtClean="0"/>
+              <a:rPr lang="en-US"/>
               <a:t>Fourth level</a:t>
             </a:r>
           </a:p>
           <a:p>
             <a:pPr lvl="4"/>
             <a:r>
-              <a:rPr lang="en-US" smtClean="0"/>
+              <a:rPr lang="en-US"/>
               <a:t>Fifth level</a:t>
             </a:r>
-            <a:endParaRPr lang="en-US"/>
           </a:p>
         </p:txBody>
       </p:sp>
@@ -2082,7 +2066,7 @@
           <a:p>
             <a:pPr lvl="0"/>
             <a:r>
-              <a:rPr lang="en-US" smtClean="0"/>
+              <a:rPr lang="en-US"/>
               <a:t>Edit Master text styles</a:t>
             </a:r>
           </a:p>
@@ -2105,7 +2089,7 @@
           <a:p>
             <a:fld id="{596A6706-5E2E-48A0-97BD-ACBF2C72B120}" type="datetimeFigureOut">
               <a:rPr lang="en-US" smtClean="0"/>
-              <a:t>6/24/2021</a:t>
+              <a:t>9/20/2021</a:t>
             </a:fld>
             <a:endParaRPr lang="en-US"/>
           </a:p>
@@ -2208,10 +2192,9 @@
           </a:lstStyle>
           <a:p>
             <a:r>
-              <a:rPr lang="en-US" smtClean="0"/>
+              <a:rPr lang="en-US"/>
               <a:t>Click to edit Master title style</a:t>
             </a:r>
-            <a:endParaRPr lang="en-US"/>
           </a:p>
         </p:txBody>
       </p:sp>
@@ -2335,7 +2318,7 @@
           <a:p>
             <a:pPr lvl="0"/>
             <a:r>
-              <a:rPr lang="en-US" smtClean="0"/>
+              <a:rPr lang="en-US"/>
               <a:t>Edit Master text styles</a:t>
             </a:r>
           </a:p>
@@ -2358,7 +2341,7 @@
           <a:p>
             <a:fld id="{596A6706-5E2E-48A0-97BD-ACBF2C72B120}" type="datetimeFigureOut">
               <a:rPr lang="en-US" smtClean="0"/>
-              <a:t>6/24/2021</a:t>
+              <a:t>9/20/2021</a:t>
             </a:fld>
             <a:endParaRPr lang="en-US"/>
           </a:p>
@@ -2467,10 +2450,9 @@
           <a:lstStyle/>
           <a:p>
             <a:r>
-              <a:rPr lang="en-US" smtClean="0"/>
+              <a:rPr lang="en-US"/>
               <a:t>Click to edit Master title style</a:t>
             </a:r>
-            <a:endParaRPr lang="en-US"/>
           </a:p>
         </p:txBody>
       </p:sp>
@@ -2501,38 +2483,37 @@
           <a:p>
             <a:pPr lvl="0"/>
             <a:r>
-              <a:rPr lang="en-US" smtClean="0"/>
+              <a:rPr lang="en-US"/>
               <a:t>Edit Master text styles</a:t>
             </a:r>
           </a:p>
           <a:p>
             <a:pPr lvl="1"/>
             <a:r>
-              <a:rPr lang="en-US" smtClean="0"/>
+              <a:rPr lang="en-US"/>
               <a:t>Second level</a:t>
             </a:r>
           </a:p>
           <a:p>
             <a:pPr lvl="2"/>
             <a:r>
-              <a:rPr lang="en-US" smtClean="0"/>
+              <a:rPr lang="en-US"/>
               <a:t>Third level</a:t>
             </a:r>
           </a:p>
           <a:p>
             <a:pPr lvl="3"/>
             <a:r>
-              <a:rPr lang="en-US" smtClean="0"/>
+              <a:rPr lang="en-US"/>
               <a:t>Fourth level</a:t>
             </a:r>
           </a:p>
           <a:p>
             <a:pPr lvl="4"/>
             <a:r>
-              <a:rPr lang="en-US" smtClean="0"/>
+              <a:rPr lang="en-US"/>
               <a:t>Fifth level</a:t>
             </a:r>
-            <a:endParaRPr lang="en-US"/>
           </a:p>
         </p:txBody>
       </p:sp>
@@ -2571,7 +2552,7 @@
           <a:p>
             <a:fld id="{596A6706-5E2E-48A0-97BD-ACBF2C72B120}" type="datetimeFigureOut">
               <a:rPr lang="en-US" smtClean="0"/>
-              <a:t>6/24/2021</a:t>
+              <a:t>9/20/2021</a:t>
             </a:fld>
             <a:endParaRPr lang="en-US"/>
           </a:p>
@@ -2992,10 +2973,9 @@
           <a:lstStyle/>
           <a:p>
             <a:r>
-              <a:rPr lang="en-US" dirty="0" smtClean="0"/>
+              <a:rPr lang="en-US" dirty="0"/>
               <a:t>Rotor Drive Tuning</a:t>
             </a:r>
-            <a:endParaRPr lang="en-US" dirty="0"/>
           </a:p>
         </p:txBody>
       </p:sp>
@@ -3015,16 +2995,15 @@
           <a:lstStyle/>
           <a:p>
             <a:r>
-              <a:rPr lang="en-US" dirty="0" smtClean="0"/>
+              <a:rPr lang="en-US" dirty="0"/>
               <a:t>Matt Fowler</a:t>
             </a:r>
           </a:p>
           <a:p>
             <a:r>
-              <a:rPr lang="en-US" dirty="0" smtClean="0"/>
+              <a:rPr lang="en-US" dirty="0"/>
               <a:t>6/23/2020</a:t>
             </a:r>
-            <a:endParaRPr lang="en-US" dirty="0"/>
           </a:p>
         </p:txBody>
       </p:sp>
@@ -3032,6 +3011,132 @@
     <p:extLst>
       <p:ext uri="{BB962C8B-B14F-4D97-AF65-F5344CB8AC3E}">
         <p14:creationId xmlns:p14="http://schemas.microsoft.com/office/powerpoint/2010/main" val="427649509"/>
+      </p:ext>
+    </p:extLst>
+  </p:cSld>
+  <p:clrMapOvr>
+    <a:masterClrMapping/>
+  </p:clrMapOvr>
+</p:sld>
+</file>
+
+<file path=ppt/slides/slide10.xml><?xml version="1.0" encoding="utf-8"?>
+<p:sld xmlns:a="http://schemas.openxmlformats.org/drawingml/2006/main" xmlns:r="http://schemas.openxmlformats.org/officeDocument/2006/relationships" xmlns:p="http://schemas.openxmlformats.org/presentationml/2006/main">
+  <p:cSld>
+    <p:spTree>
+      <p:nvGrpSpPr>
+        <p:cNvPr id="1" name=""/>
+        <p:cNvGrpSpPr/>
+        <p:nvPr/>
+      </p:nvGrpSpPr>
+      <p:grpSpPr>
+        <a:xfrm>
+          <a:off x="0" y="0"/>
+          <a:ext cx="0" cy="0"/>
+          <a:chOff x="0" y="0"/>
+          <a:chExt cx="0" cy="0"/>
+        </a:xfrm>
+      </p:grpSpPr>
+      <p:sp>
+        <p:nvSpPr>
+          <p:cNvPr id="2" name="Title 1">
+            <a:extLst>
+              <a:ext uri="{FF2B5EF4-FFF2-40B4-BE49-F238E27FC236}">
+                <a16:creationId xmlns:a16="http://schemas.microsoft.com/office/drawing/2014/main" id="{C7C02075-C02B-424E-935E-0CBDE7463E0F}"/>
+              </a:ext>
+            </a:extLst>
+          </p:cNvPr>
+          <p:cNvSpPr>
+            <a:spLocks noGrp="1"/>
+          </p:cNvSpPr>
+          <p:nvPr>
+            <p:ph type="title"/>
+          </p:nvPr>
+        </p:nvSpPr>
+        <p:spPr/>
+        <p:txBody>
+          <a:bodyPr/>
+          <a:lstStyle/>
+          <a:p>
+            <a:r>
+              <a:rPr lang="en-US" dirty="0" err="1"/>
+              <a:t>Labview</a:t>
+            </a:r>
+            <a:r>
+              <a:rPr lang="en-US" dirty="0"/>
+              <a:t> Ctrl Tuning, 9/20/2021</a:t>
+            </a:r>
+          </a:p>
+        </p:txBody>
+      </p:sp>
+      <p:sp>
+        <p:nvSpPr>
+          <p:cNvPr id="3" name="Content Placeholder 2">
+            <a:extLst>
+              <a:ext uri="{FF2B5EF4-FFF2-40B4-BE49-F238E27FC236}">
+                <a16:creationId xmlns:a16="http://schemas.microsoft.com/office/drawing/2014/main" id="{206A1DA5-4EC2-4837-9105-ABDC5D7070D9}"/>
+              </a:ext>
+            </a:extLst>
+          </p:cNvPr>
+          <p:cNvSpPr>
+            <a:spLocks noGrp="1"/>
+          </p:cNvSpPr>
+          <p:nvPr>
+            <p:ph idx="1"/>
+          </p:nvPr>
+        </p:nvSpPr>
+        <p:spPr/>
+        <p:txBody>
+          <a:bodyPr/>
+          <a:lstStyle/>
+          <a:p>
+            <a:r>
+              <a:rPr lang="en-US" dirty="0"/>
+              <a:t>Cp = 525</a:t>
+            </a:r>
+          </a:p>
+          <a:p>
+            <a:r>
+              <a:rPr lang="en-US" dirty="0"/>
+              <a:t>Ci = 3</a:t>
+            </a:r>
+          </a:p>
+        </p:txBody>
+      </p:sp>
+      <p:pic>
+        <p:nvPicPr>
+          <p:cNvPr id="6" name="Picture 5">
+            <a:extLst>
+              <a:ext uri="{FF2B5EF4-FFF2-40B4-BE49-F238E27FC236}">
+                <a16:creationId xmlns:a16="http://schemas.microsoft.com/office/drawing/2014/main" id="{BD4D321C-7C5F-4025-8561-D897ACD71D25}"/>
+              </a:ext>
+            </a:extLst>
+          </p:cNvPr>
+          <p:cNvPicPr>
+            <a:picLocks noChangeAspect="1"/>
+          </p:cNvPicPr>
+          <p:nvPr/>
+        </p:nvPicPr>
+        <p:blipFill>
+          <a:blip r:embed="rId2"/>
+          <a:stretch>
+            <a:fillRect/>
+          </a:stretch>
+        </p:blipFill>
+        <p:spPr>
+          <a:xfrm>
+            <a:off x="7241528" y="1516381"/>
+            <a:ext cx="4112272" cy="4767969"/>
+          </a:xfrm>
+          <a:prstGeom prst="rect">
+            <a:avLst/>
+          </a:prstGeom>
+        </p:spPr>
+      </p:pic>
+    </p:spTree>
+    <p:extLst>
+      <p:ext uri="{BB962C8B-B14F-4D97-AF65-F5344CB8AC3E}">
+        <p14:creationId xmlns:p14="http://schemas.microsoft.com/office/powerpoint/2010/main" val="821137847"/>
       </p:ext>
     </p:extLst>
   </p:cSld>
@@ -3074,10 +3179,9 @@
           <a:lstStyle/>
           <a:p>
             <a:r>
-              <a:rPr lang="en-US" dirty="0" smtClean="0"/>
+              <a:rPr lang="en-US" dirty="0"/>
               <a:t>Initial Tuning</a:t>
             </a:r>
-            <a:endParaRPr lang="en-US" dirty="0"/>
           </a:p>
         </p:txBody>
       </p:sp>
@@ -3102,16 +3206,15 @@
           <a:lstStyle/>
           <a:p>
             <a:r>
-              <a:rPr lang="en-US" dirty="0" smtClean="0"/>
+              <a:rPr lang="en-US" dirty="0"/>
               <a:t>Initial tuning was performed without blades attached</a:t>
             </a:r>
           </a:p>
           <a:p>
             <a:r>
-              <a:rPr lang="en-US" dirty="0" smtClean="0"/>
+              <a:rPr lang="en-US" dirty="0"/>
               <a:t>Results in R32_I64_20210429_1244.ccx</a:t>
             </a:r>
-            <a:endParaRPr lang="en-US" dirty="0"/>
           </a:p>
         </p:txBody>
       </p:sp>
@@ -3185,10 +3288,9 @@
           <a:lstStyle/>
           <a:p>
             <a:r>
-              <a:rPr lang="en-US" dirty="0" smtClean="0"/>
+              <a:rPr lang="en-US" dirty="0"/>
               <a:t>Re-tuned</a:t>
             </a:r>
-            <a:endParaRPr lang="en-US" dirty="0"/>
           </a:p>
         </p:txBody>
       </p:sp>
@@ -3208,24 +3310,20 @@
           <a:lstStyle/>
           <a:p>
             <a:r>
-              <a:rPr lang="en-US" dirty="0" smtClean="0"/>
+              <a:rPr lang="en-US" dirty="0"/>
               <a:t>Auto Tune was performed with blades attached</a:t>
             </a:r>
           </a:p>
           <a:p>
             <a:r>
-              <a:rPr lang="en-US" dirty="0" smtClean="0"/>
+              <a:rPr lang="en-US" dirty="0"/>
               <a:t>Motor Position Wrap changed from “0” to “4096”</a:t>
             </a:r>
           </a:p>
           <a:p>
             <a:r>
               <a:rPr lang="en-US" dirty="0"/>
-              <a:t>Saved as “</a:t>
-            </a:r>
-            <a:r>
-              <a:rPr lang="en-US" dirty="0" smtClean="0"/>
-              <a:t>R32_I64_20210623_1647.ccx”</a:t>
+              <a:t>Saved as “R32_I64_20210623_1647.ccx”</a:t>
             </a:r>
           </a:p>
           <a:p>
@@ -3279,10 +3377,9 @@
           <a:lstStyle/>
           <a:p>
             <a:r>
-              <a:rPr lang="en-US" dirty="0" smtClean="0"/>
+              <a:rPr lang="en-US" dirty="0"/>
               <a:t>Motor Data</a:t>
             </a:r>
-            <a:endParaRPr lang="en-US" dirty="0"/>
           </a:p>
         </p:txBody>
       </p:sp>
@@ -3302,23 +3399,22 @@
           <a:lstStyle/>
           <a:p>
             <a:r>
-              <a:rPr lang="en-US" dirty="0" smtClean="0"/>
+              <a:rPr lang="en-US" dirty="0"/>
               <a:t>Rated Speed from datasheet</a:t>
             </a:r>
           </a:p>
           <a:p>
             <a:pPr lvl="1"/>
             <a:r>
-              <a:rPr lang="en-US" dirty="0" smtClean="0"/>
+              <a:rPr lang="en-US" dirty="0"/>
               <a:t>Kennlinie_cyber_d_32__5012-D027865-03 (2).pdf</a:t>
             </a:r>
           </a:p>
           <a:p>
             <a:r>
-              <a:rPr lang="en-US" dirty="0" smtClean="0"/>
+              <a:rPr lang="en-US" dirty="0"/>
               <a:t>Other values from previous tuning </a:t>
             </a:r>
-            <a:endParaRPr lang="en-US" dirty="0"/>
           </a:p>
         </p:txBody>
       </p:sp>
@@ -3392,10 +3488,9 @@
           <a:lstStyle/>
           <a:p>
             <a:r>
-              <a:rPr lang="en-US" dirty="0" smtClean="0"/>
+              <a:rPr lang="en-US" dirty="0"/>
               <a:t>Current Loop Auto Tune</a:t>
             </a:r>
-            <a:endParaRPr lang="en-US" dirty="0"/>
           </a:p>
         </p:txBody>
       </p:sp>
@@ -3488,10 +3583,9 @@
           <a:lstStyle/>
           <a:p>
             <a:r>
-              <a:rPr lang="en-US" dirty="0" smtClean="0"/>
+              <a:rPr lang="en-US" dirty="0"/>
               <a:t>Auto Phase</a:t>
             </a:r>
-            <a:endParaRPr lang="en-US" dirty="0"/>
           </a:p>
         </p:txBody>
       </p:sp>
@@ -3511,10 +3605,9 @@
           <a:lstStyle/>
           <a:p>
             <a:r>
-              <a:rPr lang="en-US" dirty="0" smtClean="0"/>
+              <a:rPr lang="en-US" dirty="0"/>
               <a:t>Jog &gt; yielded CW rotation looking downwind (positive rotation)</a:t>
             </a:r>
-            <a:endParaRPr lang="en-US" dirty="0"/>
           </a:p>
         </p:txBody>
       </p:sp>
@@ -3612,10 +3705,9 @@
           <a:lstStyle/>
           <a:p>
             <a:r>
-              <a:rPr lang="en-US" dirty="0" smtClean="0"/>
+              <a:rPr lang="en-US" dirty="0"/>
               <a:t>Velocity Loop Auto Tune</a:t>
             </a:r>
-            <a:endParaRPr lang="en-US" dirty="0"/>
           </a:p>
         </p:txBody>
       </p:sp>
@@ -3708,10 +3800,9 @@
           <a:lstStyle/>
           <a:p>
             <a:r>
-              <a:rPr lang="en-US" dirty="0" smtClean="0"/>
+              <a:rPr lang="en-US" dirty="0"/>
               <a:t>Manually detuned Velocity Loop</a:t>
             </a:r>
-            <a:endParaRPr lang="en-US" dirty="0"/>
           </a:p>
         </p:txBody>
       </p:sp>
@@ -3731,17 +3822,17 @@
           <a:lstStyle/>
           <a:p>
             <a:r>
-              <a:rPr lang="en-US" dirty="0" smtClean="0"/>
+              <a:rPr lang="en-US" dirty="0"/>
               <a:t>Try to reduce any amplification due to load from controller</a:t>
             </a:r>
           </a:p>
           <a:p>
             <a:r>
-              <a:rPr lang="en-US" dirty="0" err="1" smtClean="0"/>
+              <a:rPr lang="en-US" dirty="0" err="1"/>
               <a:t>Vp</a:t>
             </a:r>
             <a:r>
-              <a:rPr lang="en-US" dirty="0" smtClean="0"/>
+              <a:rPr lang="en-US" dirty="0"/>
               <a:t> = 25, Vi=50</a:t>
             </a:r>
           </a:p>
@@ -3754,6 +3845,128 @@
     <p:extLst>
       <p:ext uri="{BB962C8B-B14F-4D97-AF65-F5344CB8AC3E}">
         <p14:creationId xmlns:p14="http://schemas.microsoft.com/office/powerpoint/2010/main" val="757936598"/>
+      </p:ext>
+    </p:extLst>
+  </p:cSld>
+  <p:clrMapOvr>
+    <a:masterClrMapping/>
+  </p:clrMapOvr>
+</p:sld>
+</file>
+
+<file path=ppt/slides/slide9.xml><?xml version="1.0" encoding="utf-8"?>
+<p:sld xmlns:a="http://schemas.openxmlformats.org/drawingml/2006/main" xmlns:r="http://schemas.openxmlformats.org/officeDocument/2006/relationships" xmlns:p="http://schemas.openxmlformats.org/presentationml/2006/main">
+  <p:cSld>
+    <p:spTree>
+      <p:nvGrpSpPr>
+        <p:cNvPr id="1" name=""/>
+        <p:cNvGrpSpPr/>
+        <p:nvPr/>
+      </p:nvGrpSpPr>
+      <p:grpSpPr>
+        <a:xfrm>
+          <a:off x="0" y="0"/>
+          <a:ext cx="0" cy="0"/>
+          <a:chOff x="0" y="0"/>
+          <a:chExt cx="0" cy="0"/>
+        </a:xfrm>
+      </p:grpSpPr>
+      <p:sp>
+        <p:nvSpPr>
+          <p:cNvPr id="2" name="Title 1">
+            <a:extLst>
+              <a:ext uri="{FF2B5EF4-FFF2-40B4-BE49-F238E27FC236}">
+                <a16:creationId xmlns:a16="http://schemas.microsoft.com/office/drawing/2014/main" id="{C7C02075-C02B-424E-935E-0CBDE7463E0F}"/>
+              </a:ext>
+            </a:extLst>
+          </p:cNvPr>
+          <p:cNvSpPr>
+            <a:spLocks noGrp="1"/>
+          </p:cNvSpPr>
+          <p:nvPr>
+            <p:ph type="title"/>
+          </p:nvPr>
+        </p:nvSpPr>
+        <p:spPr/>
+        <p:txBody>
+          <a:bodyPr/>
+          <a:lstStyle/>
+          <a:p>
+            <a:r>
+              <a:rPr lang="en-US" dirty="0"/>
+              <a:t>Retune, 9/14/2021</a:t>
+            </a:r>
+          </a:p>
+        </p:txBody>
+      </p:sp>
+      <p:sp>
+        <p:nvSpPr>
+          <p:cNvPr id="3" name="Content Placeholder 2">
+            <a:extLst>
+              <a:ext uri="{FF2B5EF4-FFF2-40B4-BE49-F238E27FC236}">
+                <a16:creationId xmlns:a16="http://schemas.microsoft.com/office/drawing/2014/main" id="{206A1DA5-4EC2-4837-9105-ABDC5D7070D9}"/>
+              </a:ext>
+            </a:extLst>
+          </p:cNvPr>
+          <p:cNvSpPr>
+            <a:spLocks noGrp="1"/>
+          </p:cNvSpPr>
+          <p:nvPr>
+            <p:ph idx="1"/>
+          </p:nvPr>
+        </p:nvSpPr>
+        <p:spPr/>
+        <p:txBody>
+          <a:bodyPr/>
+          <a:lstStyle/>
+          <a:p>
+            <a:r>
+              <a:rPr lang="en-US" dirty="0"/>
+              <a:t>Cp = 286</a:t>
+            </a:r>
+          </a:p>
+          <a:p>
+            <a:r>
+              <a:rPr lang="en-US" dirty="0"/>
+              <a:t>Ci = 47</a:t>
+            </a:r>
+          </a:p>
+        </p:txBody>
+      </p:sp>
+      <p:pic>
+        <p:nvPicPr>
+          <p:cNvPr id="5" name="Picture 4">
+            <a:extLst>
+              <a:ext uri="{FF2B5EF4-FFF2-40B4-BE49-F238E27FC236}">
+                <a16:creationId xmlns:a16="http://schemas.microsoft.com/office/drawing/2014/main" id="{2CEEFF28-3CE7-4F42-A55A-ABBD5D90A8F4}"/>
+              </a:ext>
+            </a:extLst>
+          </p:cNvPr>
+          <p:cNvPicPr>
+            <a:picLocks noChangeAspect="1"/>
+          </p:cNvPicPr>
+          <p:nvPr/>
+        </p:nvPicPr>
+        <p:blipFill>
+          <a:blip r:embed="rId2"/>
+          <a:stretch>
+            <a:fillRect/>
+          </a:stretch>
+        </p:blipFill>
+        <p:spPr>
+          <a:xfrm>
+            <a:off x="6840228" y="527850"/>
+            <a:ext cx="4867954" cy="5649113"/>
+          </a:xfrm>
+          <a:prstGeom prst="rect">
+            <a:avLst/>
+          </a:prstGeom>
+        </p:spPr>
+      </p:pic>
+    </p:spTree>
+    <p:extLst>
+      <p:ext uri="{BB962C8B-B14F-4D97-AF65-F5344CB8AC3E}">
+        <p14:creationId xmlns:p14="http://schemas.microsoft.com/office/powerpoint/2010/main" val="2425132843"/>
       </p:ext>
     </p:extLst>
   </p:cSld>

</xml_diff>